<commit_message>
Präsi final Vs 2.0
</commit_message>
<xml_diff>
--- a/docs/Spezifikation/WS3.pptx
+++ b/docs/Spezifikation/WS3.pptx
@@ -11,11 +11,11 @@
   <p:sldIdLst>
     <p:sldId id="256" r:id="rId3"/>
     <p:sldId id="257" r:id="rId4"/>
-    <p:sldId id="284" r:id="rId5"/>
-    <p:sldId id="283" r:id="rId6"/>
-    <p:sldId id="264" r:id="rId7"/>
-    <p:sldId id="269" r:id="rId8"/>
-    <p:sldId id="274" r:id="rId9"/>
+    <p:sldId id="283" r:id="rId5"/>
+    <p:sldId id="264" r:id="rId6"/>
+    <p:sldId id="269" r:id="rId7"/>
+    <p:sldId id="274" r:id="rId8"/>
+    <p:sldId id="284" r:id="rId9"/>
     <p:sldId id="279" r:id="rId10"/>
     <p:sldId id="270" r:id="rId11"/>
     <p:sldId id="277" r:id="rId12"/>
@@ -26692,7 +26692,7 @@
           <a:p>
             <a:r>
               <a:rPr lang="de-DE" dirty="0" smtClean="0"/>
-              <a:t>Rest-Schnittstellen manuell mit </a:t>
+              <a:t>Webservices manuell mit </a:t>
             </a:r>
             <a:r>
               <a:rPr lang="de-DE" dirty="0" err="1" smtClean="0"/>
@@ -27142,12 +27142,6 @@
           <a:p>
             <a:r>
               <a:rPr lang="de-DE" sz="2000" dirty="0" smtClean="0"/>
-              <a:t>Verwendete Technologien</a:t>
-            </a:r>
-          </a:p>
-          <a:p>
-            <a:r>
-              <a:rPr lang="de-DE" sz="2000" dirty="0" smtClean="0"/>
               <a:t>Geplante </a:t>
             </a:r>
             <a:r>
@@ -27172,7 +27166,16 @@
               <a:rPr lang="de-DE" sz="2000" dirty="0" smtClean="0"/>
               <a:t>-Cases</a:t>
             </a:r>
-            <a:endParaRPr lang="de-DE" sz="2000" dirty="0" smtClean="0"/>
+          </a:p>
+          <a:p>
+            <a:r>
+              <a:rPr lang="de-DE" sz="2000" dirty="0"/>
+              <a:t>Verwendete </a:t>
+            </a:r>
+            <a:r>
+              <a:rPr lang="de-DE" sz="2000" dirty="0" smtClean="0"/>
+              <a:t>Technologien</a:t>
+            </a:r>
           </a:p>
           <a:p>
             <a:r>
@@ -27275,183 +27278,6 @@
       </p:grpSpPr>
       <p:sp>
         <p:nvSpPr>
-          <p:cNvPr id="2" name="Titel 1"/>
-          <p:cNvSpPr>
-            <a:spLocks noGrp="1"/>
-          </p:cNvSpPr>
-          <p:nvPr>
-            <p:ph type="title"/>
-          </p:nvPr>
-        </p:nvSpPr>
-        <p:spPr/>
-        <p:txBody>
-          <a:bodyPr/>
-          <a:lstStyle/>
-          <a:p>
-            <a:r>
-              <a:rPr lang="de-DE" dirty="0" smtClean="0"/>
-              <a:t>Technologien</a:t>
-            </a:r>
-            <a:endParaRPr lang="de-DE" dirty="0"/>
-          </a:p>
-        </p:txBody>
-      </p:sp>
-      <p:sp>
-        <p:nvSpPr>
-          <p:cNvPr id="3" name="Inhaltsplatzhalter 2"/>
-          <p:cNvSpPr>
-            <a:spLocks noGrp="1"/>
-          </p:cNvSpPr>
-          <p:nvPr>
-            <p:ph sz="half" idx="1"/>
-          </p:nvPr>
-        </p:nvSpPr>
-        <p:spPr/>
-        <p:txBody>
-          <a:bodyPr/>
-          <a:lstStyle/>
-          <a:p>
-            <a:r>
-              <a:rPr lang="de-DE" dirty="0" smtClean="0"/>
-              <a:t>Client</a:t>
-            </a:r>
-          </a:p>
-          <a:p>
-            <a:endParaRPr lang="de-DE" dirty="0"/>
-          </a:p>
-          <a:p>
-            <a:pPr>
-              <a:buFont typeface="Wingdings" panose="05000000000000000000" pitchFamily="2" charset="2"/>
-              <a:buChar char="§"/>
-            </a:pPr>
-            <a:r>
-              <a:rPr lang="de-DE" dirty="0" smtClean="0"/>
-              <a:t>Smartphone App</a:t>
-            </a:r>
-          </a:p>
-          <a:p>
-            <a:pPr>
-              <a:buFont typeface="Wingdings" panose="05000000000000000000" pitchFamily="2" charset="2"/>
-              <a:buChar char="§"/>
-            </a:pPr>
-            <a:r>
-              <a:rPr lang="de-DE" dirty="0" smtClean="0"/>
-              <a:t>Android (ab </a:t>
-            </a:r>
-            <a:r>
-              <a:rPr lang="de-DE" dirty="0" err="1" smtClean="0"/>
-              <a:t>KitKat</a:t>
-            </a:r>
-            <a:r>
-              <a:rPr lang="de-DE" dirty="0" smtClean="0"/>
-              <a:t>)</a:t>
-            </a:r>
-          </a:p>
-          <a:p>
-            <a:pPr>
-              <a:buFont typeface="Wingdings" panose="05000000000000000000" pitchFamily="2" charset="2"/>
-              <a:buChar char="§"/>
-            </a:pPr>
-            <a:r>
-              <a:rPr lang="de-DE" dirty="0" smtClean="0"/>
-              <a:t>Java</a:t>
-            </a:r>
-            <a:endParaRPr lang="de-DE" dirty="0"/>
-          </a:p>
-        </p:txBody>
-      </p:sp>
-      <p:sp>
-        <p:nvSpPr>
-          <p:cNvPr id="4" name="Inhaltsplatzhalter 3"/>
-          <p:cNvSpPr>
-            <a:spLocks noGrp="1"/>
-          </p:cNvSpPr>
-          <p:nvPr>
-            <p:ph sz="half" idx="2"/>
-          </p:nvPr>
-        </p:nvSpPr>
-        <p:spPr/>
-        <p:txBody>
-          <a:bodyPr/>
-          <a:lstStyle/>
-          <a:p>
-            <a:r>
-              <a:rPr lang="de-DE" dirty="0" smtClean="0"/>
-              <a:t>Server</a:t>
-            </a:r>
-          </a:p>
-          <a:p>
-            <a:endParaRPr lang="de-DE" dirty="0"/>
-          </a:p>
-          <a:p>
-            <a:pPr>
-              <a:buFont typeface="Wingdings" panose="05000000000000000000" pitchFamily="2" charset="2"/>
-              <a:buChar char="§"/>
-            </a:pPr>
-            <a:r>
-              <a:rPr lang="de-DE" dirty="0" err="1" smtClean="0"/>
-              <a:t>Zend</a:t>
-            </a:r>
-            <a:r>
-              <a:rPr lang="de-DE" dirty="0" smtClean="0"/>
-              <a:t> Framework 2</a:t>
-            </a:r>
-          </a:p>
-          <a:p>
-            <a:pPr>
-              <a:buFont typeface="Wingdings" panose="05000000000000000000" pitchFamily="2" charset="2"/>
-              <a:buChar char="§"/>
-            </a:pPr>
-            <a:r>
-              <a:rPr lang="de-DE" dirty="0" smtClean="0"/>
-              <a:t>PHP</a:t>
-            </a:r>
-          </a:p>
-          <a:p>
-            <a:pPr>
-              <a:buFont typeface="Wingdings" panose="05000000000000000000" pitchFamily="2" charset="2"/>
-              <a:buChar char="§"/>
-            </a:pPr>
-            <a:r>
-              <a:rPr lang="de-DE" dirty="0" smtClean="0"/>
-              <a:t>MySQL-Datenbank</a:t>
-            </a:r>
-            <a:endParaRPr lang="de-DE" dirty="0"/>
-          </a:p>
-        </p:txBody>
-      </p:sp>
-    </p:spTree>
-    <p:extLst>
-      <p:ext uri="{BB962C8B-B14F-4D97-AF65-F5344CB8AC3E}">
-        <p14:creationId xmlns:p14="http://schemas.microsoft.com/office/powerpoint/2010/main" val="4283864094"/>
-      </p:ext>
-    </p:extLst>
-  </p:cSld>
-  <p:clrMapOvr>
-    <a:masterClrMapping/>
-  </p:clrMapOvr>
-</p:sld>
-</file>
-
-<file path=ppt/slides/slide4.xml><?xml version="1.0" encoding="utf-8"?>
-<p:sld xmlns:a="http://schemas.openxmlformats.org/drawingml/2006/main" xmlns:r="http://schemas.openxmlformats.org/officeDocument/2006/relationships" xmlns:p="http://schemas.openxmlformats.org/presentationml/2006/main">
-  <p:cSld>
-    <p:spTree>
-      <p:nvGrpSpPr>
-        <p:cNvPr id="1" name=""/>
-        <p:cNvGrpSpPr/>
-        <p:nvPr/>
-      </p:nvGrpSpPr>
-      <p:grpSpPr>
-        <a:xfrm>
-          <a:off x="0" y="0"/>
-          <a:ext cx="0" cy="0"/>
-          <a:chOff x="0" y="0"/>
-          <a:chExt cx="0" cy="0"/>
-        </a:xfrm>
-      </p:grpSpPr>
-      <p:sp>
-        <p:nvSpPr>
           <p:cNvPr id="2" name="Foliennummernplatzhalter 1"/>
           <p:cNvSpPr>
             <a:spLocks noGrp="1"/>
@@ -27472,7 +27298,7 @@
                 </a:solidFill>
               </a:rPr>
               <a:pPr/>
-              <a:t>4</a:t>
+              <a:t>3</a:t>
             </a:fld>
             <a:endParaRPr lang="en-US" dirty="0">
               <a:solidFill>
@@ -27525,6 +27351,153 @@
 </p:sld>
 </file>
 
+<file path=ppt/slides/slide4.xml><?xml version="1.0" encoding="utf-8"?>
+<p:sld xmlns:a="http://schemas.openxmlformats.org/drawingml/2006/main" xmlns:r="http://schemas.openxmlformats.org/officeDocument/2006/relationships" xmlns:p="http://schemas.openxmlformats.org/presentationml/2006/main">
+  <p:cSld>
+    <p:spTree>
+      <p:nvGrpSpPr>
+        <p:cNvPr id="1" name=""/>
+        <p:cNvGrpSpPr/>
+        <p:nvPr/>
+      </p:nvGrpSpPr>
+      <p:grpSpPr>
+        <a:xfrm>
+          <a:off x="0" y="0"/>
+          <a:ext cx="0" cy="0"/>
+          <a:chOff x="0" y="0"/>
+          <a:chExt cx="0" cy="0"/>
+        </a:xfrm>
+      </p:grpSpPr>
+      <p:sp>
+        <p:nvSpPr>
+          <p:cNvPr id="2" name="Titel 1"/>
+          <p:cNvSpPr>
+            <a:spLocks noGrp="1"/>
+          </p:cNvSpPr>
+          <p:nvPr>
+            <p:ph type="title"/>
+          </p:nvPr>
+        </p:nvSpPr>
+        <p:spPr/>
+        <p:txBody>
+          <a:bodyPr/>
+          <a:lstStyle/>
+          <a:p>
+            <a:r>
+              <a:rPr lang="de-DE" dirty="0" smtClean="0"/>
+              <a:t>Anwendungsfälle 1</a:t>
+            </a:r>
+            <a:endParaRPr lang="de-DE" dirty="0"/>
+          </a:p>
+        </p:txBody>
+      </p:sp>
+      <p:sp>
+        <p:nvSpPr>
+          <p:cNvPr id="3" name="Inhaltsplatzhalter 2"/>
+          <p:cNvSpPr>
+            <a:spLocks noGrp="1"/>
+          </p:cNvSpPr>
+          <p:nvPr>
+            <p:ph idx="1"/>
+          </p:nvPr>
+        </p:nvSpPr>
+        <p:spPr/>
+        <p:txBody>
+          <a:bodyPr>
+            <a:noAutofit/>
+          </a:bodyPr>
+          <a:lstStyle/>
+          <a:p>
+            <a:r>
+              <a:rPr lang="de-DE" sz="2000" dirty="0" smtClean="0"/>
+              <a:t>Der User soll sich einloggen und ausloggen können</a:t>
+            </a:r>
+          </a:p>
+          <a:p>
+            <a:r>
+              <a:rPr lang="de-DE" sz="2000" dirty="0" smtClean="0"/>
+              <a:t>Der User soll in der Hauptansicht eine Liste von konfigurierten Speisen zur Auswahl gestellt bekommen</a:t>
+            </a:r>
+          </a:p>
+          <a:p>
+            <a:r>
+              <a:rPr lang="de-DE" sz="2000" dirty="0" smtClean="0">
+                <a:solidFill>
+                  <a:schemeClr val="tx1"/>
+                </a:solidFill>
+              </a:rPr>
+              <a:t>Der User soll zu allen Speisen eine Detailansicht öffnen können</a:t>
+            </a:r>
+          </a:p>
+          <a:p>
+            <a:r>
+              <a:rPr lang="de-DE" sz="2000" dirty="0" smtClean="0">
+                <a:solidFill>
+                  <a:schemeClr val="tx1"/>
+                </a:solidFill>
+              </a:rPr>
+              <a:t>Der User soll in der Detailansicht zusätzliche Zutaten zu bestehenden Speisen auswählen und hinzufügen können</a:t>
+            </a:r>
+          </a:p>
+          <a:p>
+            <a:r>
+              <a:rPr lang="de-DE" sz="2000" dirty="0" smtClean="0"/>
+              <a:t>Der User soll neue, eigene Speisen mit den angebotenen Zutaten erstellen können</a:t>
+            </a:r>
+          </a:p>
+          <a:p>
+            <a:r>
+              <a:rPr lang="de-DE" sz="2000" dirty="0" smtClean="0"/>
+              <a:t>Der User soll neue, eigene Speisen speichern können</a:t>
+            </a:r>
+            <a:endParaRPr lang="de-DE" sz="2000" dirty="0"/>
+          </a:p>
+        </p:txBody>
+      </p:sp>
+      <p:sp>
+        <p:nvSpPr>
+          <p:cNvPr id="4" name="Foliennummernplatzhalter 3"/>
+          <p:cNvSpPr>
+            <a:spLocks noGrp="1"/>
+          </p:cNvSpPr>
+          <p:nvPr>
+            <p:ph type="sldNum" sz="quarter" idx="12"/>
+          </p:nvPr>
+        </p:nvSpPr>
+        <p:spPr/>
+        <p:txBody>
+          <a:bodyPr/>
+          <a:lstStyle/>
+          <a:p>
+            <a:fld id="{D57F1E4F-1CFF-5643-939E-217C01CDF565}" type="slidenum">
+              <a:rPr lang="en-US" smtClean="0"/>
+              <a:pPr/>
+              <a:t>4</a:t>
+            </a:fld>
+            <a:endParaRPr lang="en-US" dirty="0"/>
+          </a:p>
+        </p:txBody>
+      </p:sp>
+    </p:spTree>
+    <p:extLst>
+      <p:ext uri="{BB962C8B-B14F-4D97-AF65-F5344CB8AC3E}">
+        <p14:creationId xmlns:p14="http://schemas.microsoft.com/office/powerpoint/2010/main" val="1125634710"/>
+      </p:ext>
+    </p:extLst>
+  </p:cSld>
+  <p:clrMapOvr>
+    <a:masterClrMapping/>
+  </p:clrMapOvr>
+  <p:timing>
+    <p:tnLst>
+      <p:par>
+        <p:cTn id="1" dur="indefinite" restart="never" nodeType="tmRoot"/>
+      </p:par>
+    </p:tnLst>
+  </p:timing>
+</p:sld>
+</file>
+
 <file path=ppt/slides/slide5.xml><?xml version="1.0" encoding="utf-8"?>
 <p:sld xmlns:a="http://schemas.openxmlformats.org/drawingml/2006/main" xmlns:r="http://schemas.openxmlformats.org/officeDocument/2006/relationships" xmlns:p="http://schemas.openxmlformats.org/presentationml/2006/main">
   <p:cSld>
@@ -27559,7 +27532,7 @@
           <a:p>
             <a:r>
               <a:rPr lang="de-DE" dirty="0" smtClean="0"/>
-              <a:t>Anwendungsfälle 1</a:t>
+              <a:t>Anwendungsfälle 2</a:t>
             </a:r>
             <a:endParaRPr lang="de-DE" dirty="0"/>
           </a:p>
@@ -27583,48 +27556,58 @@
           <a:lstStyle/>
           <a:p>
             <a:r>
-              <a:rPr lang="de-DE" sz="2000" dirty="0" smtClean="0"/>
-              <a:t>Der User soll sich einloggen und ausloggen können</a:t>
-            </a:r>
-          </a:p>
-          <a:p>
-            <a:r>
-              <a:rPr lang="de-DE" sz="2000" dirty="0" smtClean="0"/>
-              <a:t>Der User soll in der Hauptansicht eine Liste von konfigurierten Speisen zur Auswahl gestellt bekommen</a:t>
-            </a:r>
-          </a:p>
-          <a:p>
+              <a:rPr lang="de-DE" sz="2000" dirty="0">
+                <a:solidFill>
+                  <a:srgbClr val="FF0000"/>
+                </a:solidFill>
+              </a:rPr>
+              <a:t>Der User soll für neu angelegte Speisen Bilder hochladen </a:t>
+            </a:r>
             <a:r>
               <a:rPr lang="de-DE" sz="2000" dirty="0" smtClean="0">
                 <a:solidFill>
-                  <a:schemeClr val="tx1"/>
+                  <a:srgbClr val="FF0000"/>
                 </a:solidFill>
               </a:rPr>
-              <a:t>Der User soll zu allen Speisen eine Detailansicht öffnen können</a:t>
+              <a:t>können</a:t>
             </a:r>
           </a:p>
           <a:p>
             <a:r>
               <a:rPr lang="de-DE" sz="2000" dirty="0" smtClean="0">
                 <a:solidFill>
-                  <a:schemeClr val="tx1"/>
+                  <a:srgbClr val="FF0000"/>
                 </a:solidFill>
               </a:rPr>
-              <a:t>Der User soll in der Detailansicht zusätzliche Zutaten zu bestehenden Speisen auswählen und hinzufügen können</a:t>
-            </a:r>
+              <a:t>Der User soll die Liste der Speisen nach eigenen / vorkonfigurierten Speisen filtern können</a:t>
+            </a:r>
+            <a:endParaRPr lang="de-DE" sz="2000" dirty="0">
+              <a:solidFill>
+                <a:srgbClr val="FF0000"/>
+              </a:solidFill>
+            </a:endParaRPr>
           </a:p>
           <a:p>
             <a:r>
               <a:rPr lang="de-DE" sz="2000" dirty="0" smtClean="0"/>
-              <a:t>Der User soll neue, eigene Speisen mit den angebotenen Zutaten erstellen können</a:t>
+              <a:t>Die App soll die Summen der Nährwerte pro Speise anzeigen</a:t>
             </a:r>
           </a:p>
           <a:p>
             <a:r>
               <a:rPr lang="de-DE" sz="2000" dirty="0" smtClean="0"/>
-              <a:t>Der User soll neue, eigene Speisen speichern können</a:t>
-            </a:r>
-            <a:endParaRPr lang="de-DE" sz="2000" dirty="0"/>
+              <a:t>Die App soll die vorkonfigurierten Speisen sowie die von Usern gespeicherten Speisen anzeigen</a:t>
+            </a:r>
+          </a:p>
+          <a:p>
+            <a:r>
+              <a:rPr lang="de-DE" sz="2000" dirty="0" smtClean="0">
+                <a:solidFill>
+                  <a:srgbClr val="FF0000"/>
+                </a:solidFill>
+              </a:rPr>
+              <a:t>Die Liste der Speisen / Zutaten soll nach vegetarisch / nicht vegetarisch gefiltert werden können</a:t>
+            </a:r>
           </a:p>
         </p:txBody>
       </p:sp>
@@ -27655,7 +27638,7 @@
     </p:spTree>
     <p:extLst>
       <p:ext uri="{BB962C8B-B14F-4D97-AF65-F5344CB8AC3E}">
-        <p14:creationId xmlns:p14="http://schemas.microsoft.com/office/powerpoint/2010/main" val="1125634710"/>
+        <p14:creationId xmlns:p14="http://schemas.microsoft.com/office/powerpoint/2010/main" val="2081992349"/>
       </p:ext>
     </p:extLst>
   </p:cSld>
@@ -27706,7 +27689,7 @@
           <a:p>
             <a:r>
               <a:rPr lang="de-DE" dirty="0" smtClean="0"/>
-              <a:t>Anwendungsfälle 2</a:t>
+              <a:t>Anwendungsfälle 3</a:t>
             </a:r>
             <a:endParaRPr lang="de-DE" dirty="0"/>
           </a:p>
@@ -27730,58 +27713,55 @@
           <a:lstStyle/>
           <a:p>
             <a:r>
-              <a:rPr lang="de-DE" sz="2000" dirty="0">
-                <a:solidFill>
-                  <a:srgbClr val="FF0000"/>
-                </a:solidFill>
-              </a:rPr>
-              <a:t>Der User soll für neu angelegte Speisen Bilder hochladen </a:t>
-            </a:r>
-            <a:r>
-              <a:rPr lang="de-DE" sz="2000" dirty="0" smtClean="0">
-                <a:solidFill>
-                  <a:srgbClr val="FF0000"/>
-                </a:solidFill>
-              </a:rPr>
+              <a:rPr lang="de-DE" sz="2000" dirty="0" smtClean="0"/>
+              <a:t>Der </a:t>
+            </a:r>
+            <a:r>
+              <a:rPr lang="de-DE" sz="2000" dirty="0"/>
+              <a:t>Admin soll neue Zutaten und vorkonfigurierte Speisen anlegen können</a:t>
+            </a:r>
+          </a:p>
+          <a:p>
+            <a:r>
+              <a:rPr lang="de-DE" sz="2000" dirty="0"/>
+              <a:t>Der Admin soll die angelegten Speisen und Zutaten verändern </a:t>
+            </a:r>
+            <a:r>
+              <a:rPr lang="de-DE" sz="2000" dirty="0" smtClean="0"/>
               <a:t>können</a:t>
             </a:r>
           </a:p>
           <a:p>
             <a:r>
-              <a:rPr lang="de-DE" sz="2000" dirty="0" smtClean="0">
-                <a:solidFill>
-                  <a:srgbClr val="FF0000"/>
-                </a:solidFill>
-              </a:rPr>
-              <a:t>Der User soll die Liste der Speisen nach eigenen / vorkonfigurierten Speisen filtern können</a:t>
-            </a:r>
-            <a:endParaRPr lang="de-DE" sz="2000" dirty="0">
-              <a:solidFill>
-                <a:srgbClr val="FF0000"/>
-              </a:solidFill>
-            </a:endParaRPr>
-          </a:p>
-          <a:p>
+              <a:rPr lang="de-DE" sz="2000" dirty="0"/>
+              <a:t>Der Admin soll die angelegten Speisen und Zutaten </a:t>
+            </a:r>
             <a:r>
               <a:rPr lang="de-DE" sz="2000" dirty="0" smtClean="0"/>
-              <a:t>Die App soll die Summen der Nährwerte pro Speise anzeigen</a:t>
+              <a:t>löschen können</a:t>
             </a:r>
           </a:p>
           <a:p>
             <a:r>
               <a:rPr lang="de-DE" sz="2000" dirty="0" smtClean="0"/>
-              <a:t>Die App soll die vorkonfigurierten Speisen sowie die von Usern gespeicherten Speisen anzeigen</a:t>
-            </a:r>
-          </a:p>
-          <a:p>
-            <a:r>
-              <a:rPr lang="de-DE" sz="2000" dirty="0" smtClean="0">
-                <a:solidFill>
-                  <a:srgbClr val="FF0000"/>
-                </a:solidFill>
-              </a:rPr>
-              <a:t>Die Liste der Speisen / Zutaten soll nach vegetarisch / nicht vegetarisch gefiltert werden können</a:t>
-            </a:r>
+              <a:t>Der Admin soll User anlegen können</a:t>
+            </a:r>
+          </a:p>
+          <a:p>
+            <a:r>
+              <a:rPr lang="de-DE" sz="2000" dirty="0" smtClean="0"/>
+              <a:t>Der Admin soll User ändern können</a:t>
+            </a:r>
+          </a:p>
+          <a:p>
+            <a:r>
+              <a:rPr lang="de-DE" sz="2000" dirty="0" smtClean="0"/>
+              <a:t>Der Admin soll User löschen können</a:t>
+            </a:r>
+            <a:endParaRPr lang="de-DE" sz="2000" dirty="0"/>
+          </a:p>
+          <a:p>
+            <a:endParaRPr lang="de-DE" sz="2000" dirty="0"/>
           </a:p>
         </p:txBody>
       </p:sp>
@@ -27812,7 +27792,7 @@
     </p:spTree>
     <p:extLst>
       <p:ext uri="{BB962C8B-B14F-4D97-AF65-F5344CB8AC3E}">
-        <p14:creationId xmlns:p14="http://schemas.microsoft.com/office/powerpoint/2010/main" val="2081992349"/>
+        <p14:creationId xmlns:p14="http://schemas.microsoft.com/office/powerpoint/2010/main" val="293455089"/>
       </p:ext>
     </p:extLst>
   </p:cSld>
@@ -27863,7 +27843,7 @@
           <a:p>
             <a:r>
               <a:rPr lang="de-DE" dirty="0" smtClean="0"/>
-              <a:t>Anwendungsfälle 3</a:t>
+              <a:t>Technologien</a:t>
             </a:r>
             <a:endParaRPr lang="de-DE" dirty="0"/>
           </a:p>
@@ -27876,77 +27856,71 @@
             <a:spLocks noGrp="1"/>
           </p:cNvSpPr>
           <p:nvPr>
-            <p:ph idx="1"/>
+            <p:ph sz="half" idx="1"/>
           </p:nvPr>
         </p:nvSpPr>
         <p:spPr/>
         <p:txBody>
-          <a:bodyPr>
-            <a:noAutofit/>
-          </a:bodyPr>
+          <a:bodyPr/>
           <a:lstStyle/>
           <a:p>
             <a:r>
-              <a:rPr lang="de-DE" sz="2000" dirty="0" smtClean="0"/>
-              <a:t>Der </a:t>
-            </a:r>
-            <a:r>
-              <a:rPr lang="de-DE" sz="2000" dirty="0"/>
-              <a:t>Admin soll neue Zutaten und vorkonfigurierte Speisen anlegen können</a:t>
-            </a:r>
-          </a:p>
-          <a:p>
-            <a:r>
-              <a:rPr lang="de-DE" sz="2000" dirty="0"/>
-              <a:t>Der Admin soll die angelegten Speisen und Zutaten verändern </a:t>
-            </a:r>
-            <a:r>
-              <a:rPr lang="de-DE" sz="2000" dirty="0" smtClean="0"/>
-              <a:t>können</a:t>
-            </a:r>
-          </a:p>
-          <a:p>
-            <a:r>
-              <a:rPr lang="de-DE" sz="2000" dirty="0"/>
-              <a:t>Der Admin soll die angelegten Speisen und Zutaten </a:t>
-            </a:r>
-            <a:r>
-              <a:rPr lang="de-DE" sz="2000" dirty="0" smtClean="0"/>
-              <a:t>löschen können</a:t>
-            </a:r>
-          </a:p>
-          <a:p>
-            <a:r>
-              <a:rPr lang="de-DE" sz="2000" dirty="0" smtClean="0"/>
-              <a:t>Der Admin soll User anlegen können</a:t>
-            </a:r>
-          </a:p>
-          <a:p>
-            <a:r>
-              <a:rPr lang="de-DE" sz="2000" dirty="0" smtClean="0"/>
-              <a:t>Der Admin soll User ändern können</a:t>
-            </a:r>
-          </a:p>
-          <a:p>
-            <a:r>
-              <a:rPr lang="de-DE" sz="2000" dirty="0" smtClean="0"/>
-              <a:t>Der Admin soll User löschen können</a:t>
-            </a:r>
-            <a:endParaRPr lang="de-DE" sz="2000" dirty="0"/>
-          </a:p>
-          <a:p>
-            <a:endParaRPr lang="de-DE" sz="2000" dirty="0"/>
+              <a:rPr lang="de-DE" b="1" dirty="0" smtClean="0"/>
+              <a:t>Client</a:t>
+            </a:r>
+          </a:p>
+          <a:p>
+            <a:endParaRPr lang="de-DE" dirty="0"/>
+          </a:p>
+          <a:p>
+            <a:pPr>
+              <a:buFont typeface="Wingdings" panose="05000000000000000000" pitchFamily="2" charset="2"/>
+              <a:buChar char="§"/>
+            </a:pPr>
+            <a:r>
+              <a:rPr lang="de-DE" dirty="0" smtClean="0"/>
+              <a:t>Smartphone App</a:t>
+            </a:r>
+          </a:p>
+          <a:p>
+            <a:pPr>
+              <a:buFont typeface="Wingdings" panose="05000000000000000000" pitchFamily="2" charset="2"/>
+              <a:buChar char="§"/>
+            </a:pPr>
+            <a:r>
+              <a:rPr lang="de-DE" dirty="0" smtClean="0"/>
+              <a:t>Android (ab </a:t>
+            </a:r>
+            <a:r>
+              <a:rPr lang="de-DE" dirty="0" err="1" smtClean="0"/>
+              <a:t>KitKat</a:t>
+            </a:r>
+            <a:r>
+              <a:rPr lang="de-DE" dirty="0" smtClean="0"/>
+              <a:t>)</a:t>
+            </a:r>
+          </a:p>
+          <a:p>
+            <a:pPr>
+              <a:buFont typeface="Wingdings" panose="05000000000000000000" pitchFamily="2" charset="2"/>
+              <a:buChar char="§"/>
+            </a:pPr>
+            <a:r>
+              <a:rPr lang="de-DE" dirty="0" smtClean="0"/>
+              <a:t>Java</a:t>
+            </a:r>
+            <a:endParaRPr lang="de-DE" dirty="0"/>
           </a:p>
         </p:txBody>
       </p:sp>
       <p:sp>
         <p:nvSpPr>
-          <p:cNvPr id="4" name="Foliennummernplatzhalter 3"/>
+          <p:cNvPr id="4" name="Inhaltsplatzhalter 3"/>
           <p:cNvSpPr>
             <a:spLocks noGrp="1"/>
           </p:cNvSpPr>
           <p:nvPr>
-            <p:ph type="sldNum" sz="quarter" idx="12"/>
+            <p:ph sz="half" idx="2"/>
           </p:nvPr>
         </p:nvSpPr>
         <p:spPr/>
@@ -27954,32 +27928,61 @@
           <a:bodyPr/>
           <a:lstStyle/>
           <a:p>
-            <a:fld id="{D57F1E4F-1CFF-5643-939E-217C01CDF565}" type="slidenum">
-              <a:rPr lang="en-US" smtClean="0"/>
-              <a:pPr/>
-              <a:t>7</a:t>
-            </a:fld>
-            <a:endParaRPr lang="en-US" dirty="0"/>
+            <a:r>
+              <a:rPr lang="de-DE" b="1" dirty="0" smtClean="0"/>
+              <a:t>Server</a:t>
+            </a:r>
+          </a:p>
+          <a:p>
+            <a:endParaRPr lang="de-DE" dirty="0"/>
+          </a:p>
+          <a:p>
+            <a:pPr>
+              <a:buFont typeface="Wingdings" panose="05000000000000000000" pitchFamily="2" charset="2"/>
+              <a:buChar char="§"/>
+            </a:pPr>
+            <a:r>
+              <a:rPr lang="de-DE" dirty="0" err="1" smtClean="0"/>
+              <a:t>Zend</a:t>
+            </a:r>
+            <a:r>
+              <a:rPr lang="de-DE" dirty="0" smtClean="0"/>
+              <a:t> Framework 2</a:t>
+            </a:r>
+          </a:p>
+          <a:p>
+            <a:pPr>
+              <a:buFont typeface="Wingdings" panose="05000000000000000000" pitchFamily="2" charset="2"/>
+              <a:buChar char="§"/>
+            </a:pPr>
+            <a:r>
+              <a:rPr lang="de-DE" dirty="0" smtClean="0"/>
+              <a:t>PHP</a:t>
+            </a:r>
+          </a:p>
+          <a:p>
+            <a:pPr>
+              <a:buFont typeface="Wingdings" panose="05000000000000000000" pitchFamily="2" charset="2"/>
+              <a:buChar char="§"/>
+            </a:pPr>
+            <a:r>
+              <a:rPr lang="de-DE" dirty="0" smtClean="0"/>
+              <a:t>MySQL-Datenbank</a:t>
+            </a:r>
+            <a:endParaRPr lang="de-DE" dirty="0"/>
           </a:p>
         </p:txBody>
       </p:sp>
     </p:spTree>
     <p:extLst>
       <p:ext uri="{BB962C8B-B14F-4D97-AF65-F5344CB8AC3E}">
-        <p14:creationId xmlns:p14="http://schemas.microsoft.com/office/powerpoint/2010/main" val="293455089"/>
+        <p14:creationId xmlns:p14="http://schemas.microsoft.com/office/powerpoint/2010/main" val="4283864094"/>
       </p:ext>
     </p:extLst>
   </p:cSld>
   <p:clrMapOvr>
     <a:masterClrMapping/>
   </p:clrMapOvr>
-  <p:timing>
-    <p:tnLst>
-      <p:par>
-        <p:cTn id="1" dur="indefinite" restart="never" nodeType="tmRoot"/>
-      </p:par>
-    </p:tnLst>
-  </p:timing>
 </p:sld>
 </file>
 

</xml_diff>